<commit_message>
Added info to first few slides, also notes
</commit_message>
<xml_diff>
--- a/Final_Presentation_Sean_Brendon.pptx
+++ b/Final_Presentation_Sean_Brendon.pptx
@@ -4,6 +4,9 @@
   <p:sldMasterIdLst>
     <p:sldMasterId id="2147483673" r:id="rId1"/>
   </p:sldMasterIdLst>
+  <p:notesMasterIdLst>
+    <p:notesMasterId r:id="rId10"/>
+  </p:notesMasterIdLst>
   <p:sldIdLst>
     <p:sldId id="256" r:id="rId2"/>
     <p:sldId id="257" r:id="rId3"/>
@@ -112,6 +115,569 @@
     </a:lvl9pPr>
   </p:defaultTextStyle>
 </p:presentation>
+</file>
+
+<file path=ppt/notesMasters/notesMaster1.xml><?xml version="1.0" encoding="utf-8"?>
+<p:notesMaster xmlns:a="http://schemas.openxmlformats.org/drawingml/2006/main" xmlns:r="http://schemas.openxmlformats.org/officeDocument/2006/relationships" xmlns:p="http://schemas.openxmlformats.org/presentationml/2006/main">
+  <p:cSld>
+    <p:bg>
+      <p:bgRef idx="1001">
+        <a:schemeClr val="bg1"/>
+      </p:bgRef>
+    </p:bg>
+    <p:spTree>
+      <p:nvGrpSpPr>
+        <p:cNvPr id="1" name=""/>
+        <p:cNvGrpSpPr/>
+        <p:nvPr/>
+      </p:nvGrpSpPr>
+      <p:grpSpPr>
+        <a:xfrm>
+          <a:off x="0" y="0"/>
+          <a:ext cx="0" cy="0"/>
+          <a:chOff x="0" y="0"/>
+          <a:chExt cx="0" cy="0"/>
+        </a:xfrm>
+      </p:grpSpPr>
+      <p:sp>
+        <p:nvSpPr>
+          <p:cNvPr id="2" name="Header Placeholder 1"/>
+          <p:cNvSpPr>
+            <a:spLocks noGrp="1"/>
+          </p:cNvSpPr>
+          <p:nvPr>
+            <p:ph type="hdr" sz="quarter"/>
+          </p:nvPr>
+        </p:nvSpPr>
+        <p:spPr>
+          <a:xfrm>
+            <a:off x="0" y="0"/>
+            <a:ext cx="2971800" cy="458788"/>
+          </a:xfrm>
+          <a:prstGeom prst="rect">
+            <a:avLst/>
+          </a:prstGeom>
+        </p:spPr>
+        <p:txBody>
+          <a:bodyPr vert="horz" lIns="91440" tIns="45720" rIns="91440" bIns="45720" rtlCol="0"/>
+          <a:lstStyle>
+            <a:lvl1pPr algn="l">
+              <a:defRPr sz="1200"/>
+            </a:lvl1pPr>
+          </a:lstStyle>
+          <a:p>
+            <a:endParaRPr lang="en-US"/>
+          </a:p>
+        </p:txBody>
+      </p:sp>
+      <p:sp>
+        <p:nvSpPr>
+          <p:cNvPr id="3" name="Date Placeholder 2"/>
+          <p:cNvSpPr>
+            <a:spLocks noGrp="1"/>
+          </p:cNvSpPr>
+          <p:nvPr>
+            <p:ph type="dt" idx="1"/>
+          </p:nvPr>
+        </p:nvSpPr>
+        <p:spPr>
+          <a:xfrm>
+            <a:off x="3884613" y="0"/>
+            <a:ext cx="2971800" cy="458788"/>
+          </a:xfrm>
+          <a:prstGeom prst="rect">
+            <a:avLst/>
+          </a:prstGeom>
+        </p:spPr>
+        <p:txBody>
+          <a:bodyPr vert="horz" lIns="91440" tIns="45720" rIns="91440" bIns="45720" rtlCol="0"/>
+          <a:lstStyle>
+            <a:lvl1pPr algn="r">
+              <a:defRPr sz="1200"/>
+            </a:lvl1pPr>
+          </a:lstStyle>
+          <a:p>
+            <a:fld id="{B9E14777-0415-F741-940C-685558C24EA1}" type="datetimeFigureOut">
+              <a:rPr lang="en-US" smtClean="0"/>
+              <a:t>3/6/24</a:t>
+            </a:fld>
+            <a:endParaRPr lang="en-US"/>
+          </a:p>
+        </p:txBody>
+      </p:sp>
+      <p:sp>
+        <p:nvSpPr>
+          <p:cNvPr id="4" name="Slide Image Placeholder 3"/>
+          <p:cNvSpPr>
+            <a:spLocks noGrp="1" noRot="1" noChangeAspect="1"/>
+          </p:cNvSpPr>
+          <p:nvPr>
+            <p:ph type="sldImg" idx="2"/>
+          </p:nvPr>
+        </p:nvSpPr>
+        <p:spPr>
+          <a:xfrm>
+            <a:off x="685800" y="1143000"/>
+            <a:ext cx="5486400" cy="3086100"/>
+          </a:xfrm>
+          <a:prstGeom prst="rect">
+            <a:avLst/>
+          </a:prstGeom>
+          <a:noFill/>
+          <a:ln w="12700">
+            <a:solidFill>
+              <a:prstClr val="black"/>
+            </a:solidFill>
+          </a:ln>
+        </p:spPr>
+        <p:txBody>
+          <a:bodyPr vert="horz" lIns="91440" tIns="45720" rIns="91440" bIns="45720" rtlCol="0" anchor="ctr"/>
+          <a:lstStyle/>
+          <a:p>
+            <a:endParaRPr lang="en-US"/>
+          </a:p>
+        </p:txBody>
+      </p:sp>
+      <p:sp>
+        <p:nvSpPr>
+          <p:cNvPr id="5" name="Notes Placeholder 4"/>
+          <p:cNvSpPr>
+            <a:spLocks noGrp="1"/>
+          </p:cNvSpPr>
+          <p:nvPr>
+            <p:ph type="body" sz="quarter" idx="3"/>
+          </p:nvPr>
+        </p:nvSpPr>
+        <p:spPr>
+          <a:xfrm>
+            <a:off x="685800" y="4400550"/>
+            <a:ext cx="5486400" cy="3600450"/>
+          </a:xfrm>
+          <a:prstGeom prst="rect">
+            <a:avLst/>
+          </a:prstGeom>
+        </p:spPr>
+        <p:txBody>
+          <a:bodyPr vert="horz" lIns="91440" tIns="45720" rIns="91440" bIns="45720" rtlCol="0"/>
+          <a:lstStyle/>
+          <a:p>
+            <a:pPr lvl="0"/>
+            <a:r>
+              <a:rPr lang="en-US"/>
+              <a:t>Click to edit Master text styles</a:t>
+            </a:r>
+          </a:p>
+          <a:p>
+            <a:pPr lvl="1"/>
+            <a:r>
+              <a:rPr lang="en-US"/>
+              <a:t>Second level</a:t>
+            </a:r>
+          </a:p>
+          <a:p>
+            <a:pPr lvl="2"/>
+            <a:r>
+              <a:rPr lang="en-US"/>
+              <a:t>Third level</a:t>
+            </a:r>
+          </a:p>
+          <a:p>
+            <a:pPr lvl="3"/>
+            <a:r>
+              <a:rPr lang="en-US"/>
+              <a:t>Fourth level</a:t>
+            </a:r>
+          </a:p>
+          <a:p>
+            <a:pPr lvl="4"/>
+            <a:r>
+              <a:rPr lang="en-US"/>
+              <a:t>Fifth level</a:t>
+            </a:r>
+          </a:p>
+        </p:txBody>
+      </p:sp>
+      <p:sp>
+        <p:nvSpPr>
+          <p:cNvPr id="6" name="Footer Placeholder 5"/>
+          <p:cNvSpPr>
+            <a:spLocks noGrp="1"/>
+          </p:cNvSpPr>
+          <p:nvPr>
+            <p:ph type="ftr" sz="quarter" idx="4"/>
+          </p:nvPr>
+        </p:nvSpPr>
+        <p:spPr>
+          <a:xfrm>
+            <a:off x="0" y="8685213"/>
+            <a:ext cx="2971800" cy="458787"/>
+          </a:xfrm>
+          <a:prstGeom prst="rect">
+            <a:avLst/>
+          </a:prstGeom>
+        </p:spPr>
+        <p:txBody>
+          <a:bodyPr vert="horz" lIns="91440" tIns="45720" rIns="91440" bIns="45720" rtlCol="0" anchor="b"/>
+          <a:lstStyle>
+            <a:lvl1pPr algn="l">
+              <a:defRPr sz="1200"/>
+            </a:lvl1pPr>
+          </a:lstStyle>
+          <a:p>
+            <a:endParaRPr lang="en-US"/>
+          </a:p>
+        </p:txBody>
+      </p:sp>
+      <p:sp>
+        <p:nvSpPr>
+          <p:cNvPr id="7" name="Slide Number Placeholder 6"/>
+          <p:cNvSpPr>
+            <a:spLocks noGrp="1"/>
+          </p:cNvSpPr>
+          <p:nvPr>
+            <p:ph type="sldNum" sz="quarter" idx="5"/>
+          </p:nvPr>
+        </p:nvSpPr>
+        <p:spPr>
+          <a:xfrm>
+            <a:off x="3884613" y="8685213"/>
+            <a:ext cx="2971800" cy="458787"/>
+          </a:xfrm>
+          <a:prstGeom prst="rect">
+            <a:avLst/>
+          </a:prstGeom>
+        </p:spPr>
+        <p:txBody>
+          <a:bodyPr vert="horz" lIns="91440" tIns="45720" rIns="91440" bIns="45720" rtlCol="0" anchor="b"/>
+          <a:lstStyle>
+            <a:lvl1pPr algn="r">
+              <a:defRPr sz="1200"/>
+            </a:lvl1pPr>
+          </a:lstStyle>
+          <a:p>
+            <a:fld id="{9C8921B4-5FC2-A248-8069-4602B3FBFF90}" type="slidenum">
+              <a:rPr lang="en-US" smtClean="0"/>
+              <a:t>‹#›</a:t>
+            </a:fld>
+            <a:endParaRPr lang="en-US"/>
+          </a:p>
+        </p:txBody>
+      </p:sp>
+    </p:spTree>
+    <p:extLst>
+      <p:ext uri="{BB962C8B-B14F-4D97-AF65-F5344CB8AC3E}">
+        <p14:creationId xmlns:p14="http://schemas.microsoft.com/office/powerpoint/2010/main" val="3082928743"/>
+      </p:ext>
+    </p:extLst>
+  </p:cSld>
+  <p:clrMap bg1="lt1" tx1="dk1" bg2="lt2" tx2="dk2" accent1="accent1" accent2="accent2" accent3="accent3" accent4="accent4" accent5="accent5" accent6="accent6" hlink="hlink" folHlink="folHlink"/>
+  <p:notesStyle>
+    <a:lvl1pPr marL="0" algn="l" defTabSz="914400" rtl="0" eaLnBrk="1" latinLnBrk="0" hangingPunct="1">
+      <a:defRPr sz="1200" kern="1200">
+        <a:solidFill>
+          <a:schemeClr val="tx1"/>
+        </a:solidFill>
+        <a:latin typeface="+mn-lt"/>
+        <a:ea typeface="+mn-ea"/>
+        <a:cs typeface="+mn-cs"/>
+      </a:defRPr>
+    </a:lvl1pPr>
+    <a:lvl2pPr marL="457200" algn="l" defTabSz="914400" rtl="0" eaLnBrk="1" latinLnBrk="0" hangingPunct="1">
+      <a:defRPr sz="1200" kern="1200">
+        <a:solidFill>
+          <a:schemeClr val="tx1"/>
+        </a:solidFill>
+        <a:latin typeface="+mn-lt"/>
+        <a:ea typeface="+mn-ea"/>
+        <a:cs typeface="+mn-cs"/>
+      </a:defRPr>
+    </a:lvl2pPr>
+    <a:lvl3pPr marL="914400" algn="l" defTabSz="914400" rtl="0" eaLnBrk="1" latinLnBrk="0" hangingPunct="1">
+      <a:defRPr sz="1200" kern="1200">
+        <a:solidFill>
+          <a:schemeClr val="tx1"/>
+        </a:solidFill>
+        <a:latin typeface="+mn-lt"/>
+        <a:ea typeface="+mn-ea"/>
+        <a:cs typeface="+mn-cs"/>
+      </a:defRPr>
+    </a:lvl3pPr>
+    <a:lvl4pPr marL="1371600" algn="l" defTabSz="914400" rtl="0" eaLnBrk="1" latinLnBrk="0" hangingPunct="1">
+      <a:defRPr sz="1200" kern="1200">
+        <a:solidFill>
+          <a:schemeClr val="tx1"/>
+        </a:solidFill>
+        <a:latin typeface="+mn-lt"/>
+        <a:ea typeface="+mn-ea"/>
+        <a:cs typeface="+mn-cs"/>
+      </a:defRPr>
+    </a:lvl4pPr>
+    <a:lvl5pPr marL="1828800" algn="l" defTabSz="914400" rtl="0" eaLnBrk="1" latinLnBrk="0" hangingPunct="1">
+      <a:defRPr sz="1200" kern="1200">
+        <a:solidFill>
+          <a:schemeClr val="tx1"/>
+        </a:solidFill>
+        <a:latin typeface="+mn-lt"/>
+        <a:ea typeface="+mn-ea"/>
+        <a:cs typeface="+mn-cs"/>
+      </a:defRPr>
+    </a:lvl5pPr>
+    <a:lvl6pPr marL="2286000" algn="l" defTabSz="914400" rtl="0" eaLnBrk="1" latinLnBrk="0" hangingPunct="1">
+      <a:defRPr sz="1200" kern="1200">
+        <a:solidFill>
+          <a:schemeClr val="tx1"/>
+        </a:solidFill>
+        <a:latin typeface="+mn-lt"/>
+        <a:ea typeface="+mn-ea"/>
+        <a:cs typeface="+mn-cs"/>
+      </a:defRPr>
+    </a:lvl6pPr>
+    <a:lvl7pPr marL="2743200" algn="l" defTabSz="914400" rtl="0" eaLnBrk="1" latinLnBrk="0" hangingPunct="1">
+      <a:defRPr sz="1200" kern="1200">
+        <a:solidFill>
+          <a:schemeClr val="tx1"/>
+        </a:solidFill>
+        <a:latin typeface="+mn-lt"/>
+        <a:ea typeface="+mn-ea"/>
+        <a:cs typeface="+mn-cs"/>
+      </a:defRPr>
+    </a:lvl7pPr>
+    <a:lvl8pPr marL="3200400" algn="l" defTabSz="914400" rtl="0" eaLnBrk="1" latinLnBrk="0" hangingPunct="1">
+      <a:defRPr sz="1200" kern="1200">
+        <a:solidFill>
+          <a:schemeClr val="tx1"/>
+        </a:solidFill>
+        <a:latin typeface="+mn-lt"/>
+        <a:ea typeface="+mn-ea"/>
+        <a:cs typeface="+mn-cs"/>
+      </a:defRPr>
+    </a:lvl8pPr>
+    <a:lvl9pPr marL="3657600" algn="l" defTabSz="914400" rtl="0" eaLnBrk="1" latinLnBrk="0" hangingPunct="1">
+      <a:defRPr sz="1200" kern="1200">
+        <a:solidFill>
+          <a:schemeClr val="tx1"/>
+        </a:solidFill>
+        <a:latin typeface="+mn-lt"/>
+        <a:ea typeface="+mn-ea"/>
+        <a:cs typeface="+mn-cs"/>
+      </a:defRPr>
+    </a:lvl9pPr>
+  </p:notesStyle>
+</p:notesMaster>
+</file>
+
+<file path=ppt/notesSlides/notesSlide1.xml><?xml version="1.0" encoding="utf-8"?>
+<p:notes xmlns:a="http://schemas.openxmlformats.org/drawingml/2006/main" xmlns:r="http://schemas.openxmlformats.org/officeDocument/2006/relationships" xmlns:p="http://schemas.openxmlformats.org/presentationml/2006/main">
+  <p:cSld>
+    <p:spTree>
+      <p:nvGrpSpPr>
+        <p:cNvPr id="1" name=""/>
+        <p:cNvGrpSpPr/>
+        <p:nvPr/>
+      </p:nvGrpSpPr>
+      <p:grpSpPr>
+        <a:xfrm>
+          <a:off x="0" y="0"/>
+          <a:ext cx="0" cy="0"/>
+          <a:chOff x="0" y="0"/>
+          <a:chExt cx="0" cy="0"/>
+        </a:xfrm>
+      </p:grpSpPr>
+      <p:sp>
+        <p:nvSpPr>
+          <p:cNvPr id="2" name="Slide Image Placeholder 1"/>
+          <p:cNvSpPr>
+            <a:spLocks noGrp="1" noRot="1" noChangeAspect="1"/>
+          </p:cNvSpPr>
+          <p:nvPr>
+            <p:ph type="sldImg"/>
+          </p:nvPr>
+        </p:nvSpPr>
+        <p:spPr/>
+      </p:sp>
+      <p:sp>
+        <p:nvSpPr>
+          <p:cNvPr id="3" name="Notes Placeholder 2"/>
+          <p:cNvSpPr>
+            <a:spLocks noGrp="1"/>
+          </p:cNvSpPr>
+          <p:nvPr>
+            <p:ph type="body" idx="1"/>
+          </p:nvPr>
+        </p:nvSpPr>
+        <p:spPr/>
+        <p:txBody>
+          <a:bodyPr/>
+          <a:lstStyle/>
+          <a:p>
+            <a:endParaRPr lang="en-US" dirty="0"/>
+          </a:p>
+        </p:txBody>
+      </p:sp>
+      <p:sp>
+        <p:nvSpPr>
+          <p:cNvPr id="4" name="Slide Number Placeholder 3"/>
+          <p:cNvSpPr>
+            <a:spLocks noGrp="1"/>
+          </p:cNvSpPr>
+          <p:nvPr>
+            <p:ph type="sldNum" sz="quarter" idx="5"/>
+          </p:nvPr>
+        </p:nvSpPr>
+        <p:spPr/>
+        <p:txBody>
+          <a:bodyPr/>
+          <a:lstStyle/>
+          <a:p>
+            <a:fld id="{9C8921B4-5FC2-A248-8069-4602B3FBFF90}" type="slidenum">
+              <a:rPr lang="en-US" smtClean="0"/>
+              <a:t>2</a:t>
+            </a:fld>
+            <a:endParaRPr lang="en-US"/>
+          </a:p>
+        </p:txBody>
+      </p:sp>
+    </p:spTree>
+    <p:extLst>
+      <p:ext uri="{BB962C8B-B14F-4D97-AF65-F5344CB8AC3E}">
+        <p14:creationId xmlns:p14="http://schemas.microsoft.com/office/powerpoint/2010/main" val="2085777713"/>
+      </p:ext>
+    </p:extLst>
+  </p:cSld>
+  <p:clrMapOvr>
+    <a:masterClrMapping/>
+  </p:clrMapOvr>
+</p:notes>
+</file>
+
+<file path=ppt/notesSlides/notesSlide2.xml><?xml version="1.0" encoding="utf-8"?>
+<p:notes xmlns:a="http://schemas.openxmlformats.org/drawingml/2006/main" xmlns:r="http://schemas.openxmlformats.org/officeDocument/2006/relationships" xmlns:p="http://schemas.openxmlformats.org/presentationml/2006/main">
+  <p:cSld>
+    <p:spTree>
+      <p:nvGrpSpPr>
+        <p:cNvPr id="1" name=""/>
+        <p:cNvGrpSpPr/>
+        <p:nvPr/>
+      </p:nvGrpSpPr>
+      <p:grpSpPr>
+        <a:xfrm>
+          <a:off x="0" y="0"/>
+          <a:ext cx="0" cy="0"/>
+          <a:chOff x="0" y="0"/>
+          <a:chExt cx="0" cy="0"/>
+        </a:xfrm>
+      </p:grpSpPr>
+      <p:sp>
+        <p:nvSpPr>
+          <p:cNvPr id="2" name="Slide Image Placeholder 1"/>
+          <p:cNvSpPr>
+            <a:spLocks noGrp="1" noRot="1" noChangeAspect="1"/>
+          </p:cNvSpPr>
+          <p:nvPr>
+            <p:ph type="sldImg"/>
+          </p:nvPr>
+        </p:nvSpPr>
+        <p:spPr/>
+      </p:sp>
+      <p:sp>
+        <p:nvSpPr>
+          <p:cNvPr id="3" name="Notes Placeholder 2"/>
+          <p:cNvSpPr>
+            <a:spLocks noGrp="1"/>
+          </p:cNvSpPr>
+          <p:nvPr>
+            <p:ph type="body" idx="1"/>
+          </p:nvPr>
+        </p:nvSpPr>
+        <p:spPr/>
+        <p:txBody>
+          <a:bodyPr/>
+          <a:lstStyle/>
+          <a:p>
+            <a:pPr marL="171450" indent="-171450">
+              <a:buFont typeface="Arial" panose="020B0604020202020204" pitchFamily="34" charset="0"/>
+              <a:buChar char="•"/>
+            </a:pPr>
+            <a:r>
+              <a:rPr lang="en-US" sz="2800" b="0" i="0" dirty="0">
+                <a:solidFill>
+                  <a:srgbClr val="3C4043"/>
+                </a:solidFill>
+                <a:effectLst/>
+                <a:latin typeface="Inter"/>
+              </a:rPr>
+              <a:t>One significant shortcoming in the data set is the ratio of male species images to female species images.</a:t>
+            </a:r>
+          </a:p>
+          <a:p>
+            <a:pPr marL="171450" indent="-171450">
+              <a:buFont typeface="Arial" panose="020B0604020202020204" pitchFamily="34" charset="0"/>
+              <a:buChar char="•"/>
+            </a:pPr>
+            <a:r>
+              <a:rPr lang="en-US" sz="2800" b="0" i="0" dirty="0">
+                <a:solidFill>
+                  <a:srgbClr val="3C4043"/>
+                </a:solidFill>
+                <a:effectLst/>
+                <a:latin typeface="Inter"/>
+              </a:rPr>
+              <a:t>About 80% of the images are of the male and 20% of the female.</a:t>
+            </a:r>
+          </a:p>
+          <a:p>
+            <a:pPr marL="171450" indent="-171450">
+              <a:buFont typeface="Arial" panose="020B0604020202020204" pitchFamily="34" charset="0"/>
+              <a:buChar char="•"/>
+            </a:pPr>
+            <a:r>
+              <a:rPr lang="en-US" sz="2800" b="0" i="0" dirty="0">
+                <a:solidFill>
+                  <a:srgbClr val="3C4043"/>
+                </a:solidFill>
+                <a:effectLst/>
+                <a:latin typeface="Inter"/>
+              </a:rPr>
+              <a:t>Males typical are far more diversely colored while the females of a species are typically bland.</a:t>
+            </a:r>
+            <a:endParaRPr lang="en-US" sz="1800" dirty="0"/>
+          </a:p>
+        </p:txBody>
+      </p:sp>
+      <p:sp>
+        <p:nvSpPr>
+          <p:cNvPr id="4" name="Slide Number Placeholder 3"/>
+          <p:cNvSpPr>
+            <a:spLocks noGrp="1"/>
+          </p:cNvSpPr>
+          <p:nvPr>
+            <p:ph type="sldNum" sz="quarter" idx="5"/>
+          </p:nvPr>
+        </p:nvSpPr>
+        <p:spPr/>
+        <p:txBody>
+          <a:bodyPr/>
+          <a:lstStyle/>
+          <a:p>
+            <a:fld id="{9C8921B4-5FC2-A248-8069-4602B3FBFF90}" type="slidenum">
+              <a:rPr lang="en-US" smtClean="0"/>
+              <a:t>3</a:t>
+            </a:fld>
+            <a:endParaRPr lang="en-US"/>
+          </a:p>
+        </p:txBody>
+      </p:sp>
+    </p:spTree>
+    <p:extLst>
+      <p:ext uri="{BB962C8B-B14F-4D97-AF65-F5344CB8AC3E}">
+        <p14:creationId xmlns:p14="http://schemas.microsoft.com/office/powerpoint/2010/main" val="2124533923"/>
+      </p:ext>
+    </p:extLst>
+  </p:cSld>
+  <p:clrMapOvr>
+    <a:masterClrMapping/>
+  </p:clrMapOvr>
+</p:notes>
 </file>
 
 <file path=ppt/slideLayouts/slideLayout1.xml><?xml version="1.0" encoding="utf-8"?>
@@ -3833,6 +4399,17 @@
 <file path=ppt/slides/slide2.xml><?xml version="1.0" encoding="utf-8"?>
 <p:sld xmlns:a="http://schemas.openxmlformats.org/drawingml/2006/main" xmlns:r="http://schemas.openxmlformats.org/officeDocument/2006/relationships" xmlns:p="http://schemas.openxmlformats.org/presentationml/2006/main">
   <p:cSld>
+    <p:bg>
+      <p:bgPr>
+        <a:solidFill>
+          <a:schemeClr val="bg1">
+            <a:lumMod val="85000"/>
+            <a:lumOff val="15000"/>
+          </a:schemeClr>
+        </a:solidFill>
+        <a:effectLst/>
+      </p:bgPr>
+    </p:bg>
     <p:spTree>
       <p:nvGrpSpPr>
         <p:cNvPr id="1" name=""/>
@@ -3847,6 +4424,82 @@
           <a:chExt cx="0" cy="0"/>
         </a:xfrm>
       </p:grpSpPr>
+      <p:sp useBgFill="1">
+        <p:nvSpPr>
+          <p:cNvPr id="19" name="Rectangle 18">
+            <a:extLst>
+              <a:ext uri="{FF2B5EF4-FFF2-40B4-BE49-F238E27FC236}">
+                <a16:creationId xmlns:a16="http://schemas.microsoft.com/office/drawing/2014/main" id="{BF02845A-8571-40C5-9F56-8F9B3F7C4E4C}"/>
+              </a:ext>
+              <a:ext uri="{C183D7F6-B498-43B3-948B-1728B52AA6E4}">
+                <adec:decorative xmlns:adec="http://schemas.microsoft.com/office/drawing/2017/decorative" val="1"/>
+              </a:ext>
+            </a:extLst>
+          </p:cNvPr>
+          <p:cNvSpPr>
+            <a:spLocks noGrp="1" noRot="1" noChangeAspect="1" noMove="1" noResize="1" noEditPoints="1" noAdjustHandles="1" noChangeArrowheads="1" noChangeShapeType="1" noTextEdit="1"/>
+          </p:cNvSpPr>
+          <p:nvPr>
+            <p:extLst>
+              <p:ext uri="{386F3935-93C4-4BCD-93E2-E3B085C9AB24}">
+                <p16:designElem xmlns:p16="http://schemas.microsoft.com/office/powerpoint/2015/main" val="1"/>
+              </p:ext>
+            </p:extLst>
+          </p:nvPr>
+        </p:nvSpPr>
+        <p:spPr>
+          <a:xfrm>
+            <a:off x="0" y="0"/>
+            <a:ext cx="12192000" cy="6858000"/>
+          </a:xfrm>
+          <a:prstGeom prst="rect">
+            <a:avLst/>
+          </a:prstGeom>
+          <a:ln w="12700" cap="flat" cmpd="sng" algn="ctr">
+            <a:noFill/>
+            <a:prstDash val="solid"/>
+            <a:miter lim="800000"/>
+          </a:ln>
+          <a:effectLst/>
+          <a:extLst>
+            <a:ext uri="{91240B29-F687-4F45-9708-019B960494DF}">
+              <a14:hiddenLine xmlns:a14="http://schemas.microsoft.com/office/drawing/2010/main" w="12700" cap="flat" cmpd="sng" algn="ctr">
+                <a:solidFill>
+                  <a:schemeClr val="accent1">
+                    <a:shade val="50000"/>
+                  </a:schemeClr>
+                </a:solidFill>
+                <a:prstDash val="solid"/>
+                <a:miter lim="800000"/>
+              </a14:hiddenLine>
+            </a:ext>
+          </a:extLst>
+        </p:spPr>
+        <p:style>
+          <a:lnRef idx="2">
+            <a:schemeClr val="accent1">
+              <a:shade val="50000"/>
+            </a:schemeClr>
+          </a:lnRef>
+          <a:fillRef idx="1">
+            <a:schemeClr val="accent1"/>
+          </a:fillRef>
+          <a:effectRef idx="0">
+            <a:schemeClr val="accent1"/>
+          </a:effectRef>
+          <a:fontRef idx="minor">
+            <a:schemeClr val="lt1"/>
+          </a:fontRef>
+        </p:style>
+        <p:txBody>
+          <a:bodyPr rtlCol="0" anchor="ctr"/>
+          <a:lstStyle/>
+          <a:p>
+            <a:pPr algn="ctr"/>
+            <a:endParaRPr lang="en-US"/>
+          </a:p>
+        </p:txBody>
+      </p:sp>
       <p:sp>
         <p:nvSpPr>
           <p:cNvPr id="2" name="Title 1">
@@ -3863,12 +4516,18 @@
             <p:ph type="title"/>
           </p:nvPr>
         </p:nvSpPr>
-        <p:spPr/>
-        <p:txBody>
-          <a:bodyPr/>
-          <a:lstStyle/>
-          <a:p>
-            <a:pPr algn="ctr"/>
+        <p:spPr>
+          <a:xfrm>
+            <a:off x="4477771" y="895440"/>
+            <a:ext cx="6037830" cy="1540783"/>
+          </a:xfrm>
+        </p:spPr>
+        <p:txBody>
+          <a:bodyPr>
+            <a:normAutofit/>
+          </a:bodyPr>
+          <a:lstStyle/>
+          <a:p>
             <a:r>
               <a:rPr lang="en-US" dirty="0"/>
               <a:t>Problem Description</a:t>
@@ -3876,12 +4535,94 @@
           </a:p>
         </p:txBody>
       </p:sp>
-      <p:sp>
-        <p:nvSpPr>
-          <p:cNvPr id="3" name="Content Placeholder 2">
-            <a:extLst>
-              <a:ext uri="{FF2B5EF4-FFF2-40B4-BE49-F238E27FC236}">
-                <a16:creationId xmlns:a16="http://schemas.microsoft.com/office/drawing/2014/main" id="{23E0AE39-EDC3-7DBE-BA4C-9FB4ACAE94D9}"/>
+      <p:pic>
+        <p:nvPicPr>
+          <p:cNvPr id="10" name="Picture 9" descr="A bald eagle with a yellow beak&#10;&#10;Description automatically generated">
+            <a:extLst>
+              <a:ext uri="{FF2B5EF4-FFF2-40B4-BE49-F238E27FC236}">
+                <a16:creationId xmlns:a16="http://schemas.microsoft.com/office/drawing/2014/main" id="{EB0A32B7-66E8-7FC3-491B-1E256C4B6AA3}"/>
+              </a:ext>
+            </a:extLst>
+          </p:cNvPr>
+          <p:cNvPicPr>
+            <a:picLocks noChangeAspect="1"/>
+          </p:cNvPicPr>
+          <p:nvPr/>
+        </p:nvPicPr>
+        <p:blipFill>
+          <a:blip r:embed="rId3"/>
+          <a:stretch>
+            <a:fillRect/>
+          </a:stretch>
+        </p:blipFill>
+        <p:spPr>
+          <a:xfrm>
+            <a:off x="952500" y="1986274"/>
+            <a:ext cx="2962082" cy="2962082"/>
+          </a:xfrm>
+          <a:prstGeom prst="rect">
+            <a:avLst/>
+          </a:prstGeom>
+        </p:spPr>
+      </p:pic>
+      <p:cxnSp>
+        <p:nvCxnSpPr>
+          <p:cNvPr id="21" name="Straight Connector 20">
+            <a:extLst>
+              <a:ext uri="{FF2B5EF4-FFF2-40B4-BE49-F238E27FC236}">
+                <a16:creationId xmlns:a16="http://schemas.microsoft.com/office/drawing/2014/main" id="{F30BB598-81B4-41BB-BC44-CD9C29AE2EAB}"/>
+              </a:ext>
+              <a:ext uri="{C183D7F6-B498-43B3-948B-1728B52AA6E4}">
+                <adec:decorative xmlns:adec="http://schemas.microsoft.com/office/drawing/2017/decorative" val="1"/>
+              </a:ext>
+            </a:extLst>
+          </p:cNvPr>
+          <p:cNvCxnSpPr>
+            <a:cxnSpLocks noGrp="1" noRot="1" noChangeAspect="1" noMove="1" noResize="1" noEditPoints="1" noAdjustHandles="1" noChangeArrowheads="1" noChangeShapeType="1"/>
+          </p:cNvCxnSpPr>
+          <p:nvPr>
+            <p:extLst>
+              <p:ext uri="{386F3935-93C4-4BCD-93E2-E3B085C9AB24}">
+                <p16:designElem xmlns:p16="http://schemas.microsoft.com/office/powerpoint/2015/main" val="1"/>
+              </p:ext>
+            </p:extLst>
+          </p:nvPr>
+        </p:nvCxnSpPr>
+        <p:spPr>
+          <a:xfrm>
+            <a:off x="4611830" y="2710543"/>
+            <a:ext cx="0" cy="3347785"/>
+          </a:xfrm>
+          <a:prstGeom prst="line">
+            <a:avLst/>
+          </a:prstGeom>
+          <a:ln w="10795">
+            <a:solidFill>
+              <a:schemeClr val="tx2"/>
+            </a:solidFill>
+          </a:ln>
+        </p:spPr>
+        <p:style>
+          <a:lnRef idx="1">
+            <a:schemeClr val="accent1"/>
+          </a:lnRef>
+          <a:fillRef idx="0">
+            <a:schemeClr val="accent1"/>
+          </a:fillRef>
+          <a:effectRef idx="0">
+            <a:schemeClr val="accent1"/>
+          </a:effectRef>
+          <a:fontRef idx="minor">
+            <a:schemeClr val="tx1"/>
+          </a:fontRef>
+        </p:style>
+      </p:cxnSp>
+      <p:sp>
+        <p:nvSpPr>
+          <p:cNvPr id="9" name="Content Placeholder 8">
+            <a:extLst>
+              <a:ext uri="{FF2B5EF4-FFF2-40B4-BE49-F238E27FC236}">
+                <a16:creationId xmlns:a16="http://schemas.microsoft.com/office/drawing/2014/main" id="{4C513CA6-A535-9C83-804A-C527C0D92D8F}"/>
               </a:ext>
             </a:extLst>
           </p:cNvPr>
@@ -3892,10 +4633,35 @@
             <p:ph idx="1"/>
           </p:nvPr>
         </p:nvSpPr>
-        <p:spPr/>
-        <p:txBody>
-          <a:bodyPr/>
-          <a:lstStyle/>
+        <p:spPr>
+          <a:xfrm>
+            <a:off x="5207521" y="2710544"/>
+            <a:ext cx="5369231" cy="3428596"/>
+          </a:xfrm>
+        </p:spPr>
+        <p:txBody>
+          <a:bodyPr anchor="b">
+            <a:normAutofit/>
+          </a:bodyPr>
+          <a:lstStyle/>
+          <a:p>
+            <a:r>
+              <a:rPr lang="en-US" dirty="0"/>
+              <a:t>We will be building a CNN to identify various bird species from each other</a:t>
+            </a:r>
+          </a:p>
+          <a:p>
+            <a:r>
+              <a:rPr lang="en-US" dirty="0"/>
+              <a:t>Explore how various factors such as image size, greyscale, and more effect the model’s ability to classify different species</a:t>
+            </a:r>
+          </a:p>
+          <a:p>
+            <a:r>
+              <a:rPr lang="en-US" dirty="0"/>
+              <a:t>The dataset provided an efficentNetB0 model with a high training and validation accuracy for comparison</a:t>
+            </a:r>
+          </a:p>
           <a:p>
             <a:endParaRPr lang="en-US" dirty="0"/>
           </a:p>
@@ -3917,6 +4683,14 @@
 <file path=ppt/slides/slide3.xml><?xml version="1.0" encoding="utf-8"?>
 <p:sld xmlns:a="http://schemas.openxmlformats.org/drawingml/2006/main" xmlns:r="http://schemas.openxmlformats.org/officeDocument/2006/relationships" xmlns:p="http://schemas.openxmlformats.org/presentationml/2006/main">
   <p:cSld>
+    <p:bg>
+      <p:bgPr>
+        <a:solidFill>
+          <a:schemeClr val="bg2"/>
+        </a:solidFill>
+        <a:effectLst/>
+      </p:bgPr>
+    </p:bg>
     <p:spTree>
       <p:nvGrpSpPr>
         <p:cNvPr id="1" name=""/>
@@ -3931,6 +4705,82 @@
           <a:chExt cx="0" cy="0"/>
         </a:xfrm>
       </p:grpSpPr>
+      <p:sp useBgFill="1">
+        <p:nvSpPr>
+          <p:cNvPr id="31" name="Rectangle 30">
+            <a:extLst>
+              <a:ext uri="{FF2B5EF4-FFF2-40B4-BE49-F238E27FC236}">
+                <a16:creationId xmlns:a16="http://schemas.microsoft.com/office/drawing/2014/main" id="{BF02845A-8571-40C5-9F56-8F9B3F7C4E4C}"/>
+              </a:ext>
+              <a:ext uri="{C183D7F6-B498-43B3-948B-1728B52AA6E4}">
+                <adec:decorative xmlns:adec="http://schemas.microsoft.com/office/drawing/2017/decorative" val="1"/>
+              </a:ext>
+            </a:extLst>
+          </p:cNvPr>
+          <p:cNvSpPr>
+            <a:spLocks noGrp="1" noRot="1" noChangeAspect="1" noMove="1" noResize="1" noEditPoints="1" noAdjustHandles="1" noChangeArrowheads="1" noChangeShapeType="1" noTextEdit="1"/>
+          </p:cNvSpPr>
+          <p:nvPr>
+            <p:extLst>
+              <p:ext uri="{386F3935-93C4-4BCD-93E2-E3B085C9AB24}">
+                <p16:designElem xmlns:p16="http://schemas.microsoft.com/office/powerpoint/2015/main" val="1"/>
+              </p:ext>
+            </p:extLst>
+          </p:nvPr>
+        </p:nvSpPr>
+        <p:spPr>
+          <a:xfrm>
+            <a:off x="0" y="0"/>
+            <a:ext cx="12192000" cy="6858000"/>
+          </a:xfrm>
+          <a:prstGeom prst="rect">
+            <a:avLst/>
+          </a:prstGeom>
+          <a:ln w="12700" cap="flat" cmpd="sng" algn="ctr">
+            <a:noFill/>
+            <a:prstDash val="solid"/>
+            <a:miter lim="800000"/>
+          </a:ln>
+          <a:effectLst/>
+          <a:extLst>
+            <a:ext uri="{91240B29-F687-4F45-9708-019B960494DF}">
+              <a14:hiddenLine xmlns:a14="http://schemas.microsoft.com/office/drawing/2010/main" w="12700" cap="flat" cmpd="sng" algn="ctr">
+                <a:solidFill>
+                  <a:schemeClr val="accent1">
+                    <a:shade val="50000"/>
+                  </a:schemeClr>
+                </a:solidFill>
+                <a:prstDash val="solid"/>
+                <a:miter lim="800000"/>
+              </a14:hiddenLine>
+            </a:ext>
+          </a:extLst>
+        </p:spPr>
+        <p:style>
+          <a:lnRef idx="2">
+            <a:schemeClr val="accent1">
+              <a:shade val="50000"/>
+            </a:schemeClr>
+          </a:lnRef>
+          <a:fillRef idx="1">
+            <a:schemeClr val="accent1"/>
+          </a:fillRef>
+          <a:effectRef idx="0">
+            <a:schemeClr val="accent1"/>
+          </a:effectRef>
+          <a:fontRef idx="minor">
+            <a:schemeClr val="lt1"/>
+          </a:fontRef>
+        </p:style>
+        <p:txBody>
+          <a:bodyPr rtlCol="0" anchor="ctr"/>
+          <a:lstStyle/>
+          <a:p>
+            <a:pPr algn="ctr"/>
+            <a:endParaRPr lang="en-US"/>
+          </a:p>
+        </p:txBody>
+      </p:sp>
       <p:sp>
         <p:nvSpPr>
           <p:cNvPr id="2" name="Title 1">
@@ -3947,19 +4797,78 @@
             <p:ph type="title"/>
           </p:nvPr>
         </p:nvSpPr>
-        <p:spPr/>
-        <p:txBody>
-          <a:bodyPr/>
-          <a:lstStyle/>
-          <a:p>
-            <a:pPr algn="ctr"/>
+        <p:spPr>
+          <a:xfrm>
+            <a:off x="764593" y="895440"/>
+            <a:ext cx="4569407" cy="1560083"/>
+          </a:xfrm>
+        </p:spPr>
+        <p:txBody>
+          <a:bodyPr>
+            <a:normAutofit/>
+          </a:bodyPr>
+          <a:lstStyle/>
+          <a:p>
             <a:r>
               <a:rPr lang="en-US" dirty="0"/>
               <a:t>Dataset</a:t>
             </a:r>
-          </a:p>
-        </p:txBody>
-      </p:sp>
+            <a:endParaRPr lang="en-US"/>
+          </a:p>
+        </p:txBody>
+      </p:sp>
+      <p:cxnSp>
+        <p:nvCxnSpPr>
+          <p:cNvPr id="33" name="Straight Connector 32">
+            <a:extLst>
+              <a:ext uri="{FF2B5EF4-FFF2-40B4-BE49-F238E27FC236}">
+                <a16:creationId xmlns:a16="http://schemas.microsoft.com/office/drawing/2014/main" id="{F30BB598-81B4-41BB-BC44-CD9C29AE2EAB}"/>
+              </a:ext>
+              <a:ext uri="{C183D7F6-B498-43B3-948B-1728B52AA6E4}">
+                <adec:decorative xmlns:adec="http://schemas.microsoft.com/office/drawing/2017/decorative" val="1"/>
+              </a:ext>
+            </a:extLst>
+          </p:cNvPr>
+          <p:cNvCxnSpPr>
+            <a:cxnSpLocks noGrp="1" noRot="1" noChangeAspect="1" noMove="1" noResize="1" noEditPoints="1" noAdjustHandles="1" noChangeArrowheads="1" noChangeShapeType="1"/>
+          </p:cNvCxnSpPr>
+          <p:nvPr>
+            <p:extLst>
+              <p:ext uri="{386F3935-93C4-4BCD-93E2-E3B085C9AB24}">
+                <p16:designElem xmlns:p16="http://schemas.microsoft.com/office/powerpoint/2015/main" val="1"/>
+              </p:ext>
+            </p:extLst>
+          </p:nvPr>
+        </p:nvCxnSpPr>
+        <p:spPr>
+          <a:xfrm>
+            <a:off x="952500" y="2871627"/>
+            <a:ext cx="0" cy="3186701"/>
+          </a:xfrm>
+          <a:prstGeom prst="line">
+            <a:avLst/>
+          </a:prstGeom>
+          <a:ln w="10795">
+            <a:solidFill>
+              <a:schemeClr val="tx2"/>
+            </a:solidFill>
+          </a:ln>
+        </p:spPr>
+        <p:style>
+          <a:lnRef idx="1">
+            <a:schemeClr val="accent1"/>
+          </a:lnRef>
+          <a:fillRef idx="0">
+            <a:schemeClr val="accent1"/>
+          </a:fillRef>
+          <a:effectRef idx="0">
+            <a:schemeClr val="accent1"/>
+          </a:effectRef>
+          <a:fontRef idx="minor">
+            <a:schemeClr val="tx1"/>
+          </a:fontRef>
+        </p:style>
+      </p:cxnSp>
       <p:sp>
         <p:nvSpPr>
           <p:cNvPr id="3" name="Content Placeholder 2">
@@ -3976,15 +4885,103 @@
             <p:ph idx="1"/>
           </p:nvPr>
         </p:nvSpPr>
-        <p:spPr/>
-        <p:txBody>
-          <a:bodyPr/>
-          <a:lstStyle/>
-          <a:p>
-            <a:endParaRPr lang="en-US"/>
-          </a:p>
-        </p:txBody>
-      </p:sp>
+        <p:spPr>
+          <a:xfrm>
+            <a:off x="1570033" y="2753546"/>
+            <a:ext cx="3746928" cy="3402555"/>
+          </a:xfrm>
+        </p:spPr>
+        <p:txBody>
+          <a:bodyPr anchor="t">
+            <a:normAutofit/>
+          </a:bodyPr>
+          <a:lstStyle/>
+          <a:p>
+            <a:pPr>
+              <a:lnSpc>
+                <a:spcPct val="110000"/>
+              </a:lnSpc>
+            </a:pPr>
+            <a:r>
+              <a:rPr lang="en-US" sz="1700"/>
+              <a:t>The full dataset contains 525 unique species of birds with 100-200 images per species</a:t>
+            </a:r>
+          </a:p>
+          <a:p>
+            <a:pPr>
+              <a:lnSpc>
+                <a:spcPct val="110000"/>
+              </a:lnSpc>
+            </a:pPr>
+            <a:r>
+              <a:rPr lang="en-US" sz="1700"/>
+              <a:t>The training data was reduced to 20 species with 100 images per species</a:t>
+            </a:r>
+          </a:p>
+          <a:p>
+            <a:pPr>
+              <a:lnSpc>
+                <a:spcPct val="110000"/>
+              </a:lnSpc>
+            </a:pPr>
+            <a:r>
+              <a:rPr lang="en-US" sz="1700"/>
+              <a:t>The validation and test sets contain 5 image for each type of bird</a:t>
+            </a:r>
+          </a:p>
+          <a:p>
+            <a:pPr>
+              <a:lnSpc>
+                <a:spcPct val="110000"/>
+              </a:lnSpc>
+            </a:pPr>
+            <a:r>
+              <a:rPr lang="en-US" sz="1700"/>
+              <a:t>Each image contains only one bird, which comprises at least 50% of the pixels</a:t>
+            </a:r>
+          </a:p>
+          <a:p>
+            <a:pPr>
+              <a:lnSpc>
+                <a:spcPct val="110000"/>
+              </a:lnSpc>
+            </a:pPr>
+            <a:endParaRPr lang="en-US" sz="1700"/>
+          </a:p>
+        </p:txBody>
+      </p:sp>
+      <p:pic>
+        <p:nvPicPr>
+          <p:cNvPr id="7" name="Picture 6" descr="Eurasian Golden Oriole&#10;">
+            <a:extLst>
+              <a:ext uri="{FF2B5EF4-FFF2-40B4-BE49-F238E27FC236}">
+                <a16:creationId xmlns:a16="http://schemas.microsoft.com/office/drawing/2014/main" id="{0A634FE1-5DB9-75E6-0C12-A903F3FFC9FE}"/>
+              </a:ext>
+              <a:ext uri="{C183D7F6-B498-43B3-948B-1728B52AA6E4}">
+                <adec:decorative xmlns:adec="http://schemas.microsoft.com/office/drawing/2017/decorative" val="0"/>
+              </a:ext>
+            </a:extLst>
+          </p:cNvPr>
+          <p:cNvPicPr>
+            <a:picLocks noChangeAspect="1"/>
+          </p:cNvPicPr>
+          <p:nvPr/>
+        </p:nvPicPr>
+        <p:blipFill rotWithShape="1">
+          <a:blip r:embed="rId3"/>
+          <a:srcRect l="4883" r="6281"/>
+          <a:stretch/>
+        </p:blipFill>
+        <p:spPr>
+          <a:xfrm>
+            <a:off x="6096000" y="-16591"/>
+            <a:ext cx="6107073" cy="6874591"/>
+          </a:xfrm>
+          <a:prstGeom prst="rect">
+            <a:avLst/>
+          </a:prstGeom>
+        </p:spPr>
+      </p:pic>
     </p:spTree>
     <p:extLst>
       <p:ext uri="{BB962C8B-B14F-4D97-AF65-F5344CB8AC3E}">
@@ -4065,7 +5062,23 @@
           <a:bodyPr/>
           <a:lstStyle/>
           <a:p>
-            <a:endParaRPr lang="en-US"/>
+            <a:r>
+              <a:rPr lang="en-US" dirty="0"/>
+              <a:t>The provided </a:t>
+            </a:r>
+            <a:r>
+              <a:rPr lang="en-US" dirty="0" err="1"/>
+              <a:t>EfficientNet</a:t>
+            </a:r>
+            <a:r>
+              <a:rPr lang="en-US" dirty="0"/>
+              <a:t> model achieve 98% training accuracy and 92% validation accuracy after </a:t>
+            </a:r>
+            <a:r>
+              <a:rPr lang="en-US"/>
+              <a:t>12 epochs</a:t>
+            </a:r>
+            <a:endParaRPr lang="en-US" dirty="0"/>
           </a:p>
         </p:txBody>
       </p:sp>
@@ -4617,4 +5630,299 @@
     </a:ext>
   </a:extLst>
 </a:theme>
+</file>
+
+<file path=ppt/theme/theme2.xml><?xml version="1.0" encoding="utf-8"?>
+<a:theme xmlns:a="http://schemas.openxmlformats.org/drawingml/2006/main" name="Office Theme">
+  <a:themeElements>
+    <a:clrScheme name="Office">
+      <a:dk1>
+        <a:sysClr val="windowText" lastClr="000000"/>
+      </a:dk1>
+      <a:lt1>
+        <a:sysClr val="window" lastClr="FFFFFF"/>
+      </a:lt1>
+      <a:dk2>
+        <a:srgbClr val="44546A"/>
+      </a:dk2>
+      <a:lt2>
+        <a:srgbClr val="E7E6E6"/>
+      </a:lt2>
+      <a:accent1>
+        <a:srgbClr val="4472C4"/>
+      </a:accent1>
+      <a:accent2>
+        <a:srgbClr val="ED7D31"/>
+      </a:accent2>
+      <a:accent3>
+        <a:srgbClr val="A5A5A5"/>
+      </a:accent3>
+      <a:accent4>
+        <a:srgbClr val="FFC000"/>
+      </a:accent4>
+      <a:accent5>
+        <a:srgbClr val="5B9BD5"/>
+      </a:accent5>
+      <a:accent6>
+        <a:srgbClr val="70AD47"/>
+      </a:accent6>
+      <a:hlink>
+        <a:srgbClr val="0563C1"/>
+      </a:hlink>
+      <a:folHlink>
+        <a:srgbClr val="954F72"/>
+      </a:folHlink>
+    </a:clrScheme>
+    <a:fontScheme name="Office">
+      <a:majorFont>
+        <a:latin typeface="Calibri Light" panose="020F0302020204030204"/>
+        <a:ea typeface=""/>
+        <a:cs typeface=""/>
+        <a:font script="Jpan" typeface="游ゴシック Light"/>
+        <a:font script="Hang" typeface="맑은 고딕"/>
+        <a:font script="Hans" typeface="等线 Light"/>
+        <a:font script="Hant" typeface="新細明體"/>
+        <a:font script="Arab" typeface="Times New Roman"/>
+        <a:font script="Hebr" typeface="Times New Roman"/>
+        <a:font script="Thai" typeface="Angsana New"/>
+        <a:font script="Ethi" typeface="Nyala"/>
+        <a:font script="Beng" typeface="Vrinda"/>
+        <a:font script="Gujr" typeface="Shruti"/>
+        <a:font script="Khmr" typeface="MoolBoran"/>
+        <a:font script="Knda" typeface="Tunga"/>
+        <a:font script="Guru" typeface="Raavi"/>
+        <a:font script="Cans" typeface="Euphemia"/>
+        <a:font script="Cher" typeface="Plantagenet Cherokee"/>
+        <a:font script="Yiii" typeface="Microsoft Yi Baiti"/>
+        <a:font script="Tibt" typeface="Microsoft Himalaya"/>
+        <a:font script="Thaa" typeface="MV Boli"/>
+        <a:font script="Deva" typeface="Mangal"/>
+        <a:font script="Telu" typeface="Gautami"/>
+        <a:font script="Taml" typeface="Latha"/>
+        <a:font script="Syrc" typeface="Estrangelo Edessa"/>
+        <a:font script="Orya" typeface="Kalinga"/>
+        <a:font script="Mlym" typeface="Kartika"/>
+        <a:font script="Laoo" typeface="DokChampa"/>
+        <a:font script="Sinh" typeface="Iskoola Pota"/>
+        <a:font script="Mong" typeface="Mongolian Baiti"/>
+        <a:font script="Viet" typeface="Times New Roman"/>
+        <a:font script="Uigh" typeface="Microsoft Uighur"/>
+        <a:font script="Geor" typeface="Sylfaen"/>
+        <a:font script="Armn" typeface="Arial"/>
+        <a:font script="Bugi" typeface="Leelawadee UI"/>
+        <a:font script="Bopo" typeface="Microsoft JhengHei"/>
+        <a:font script="Java" typeface="Javanese Text"/>
+        <a:font script="Lisu" typeface="Segoe UI"/>
+        <a:font script="Mymr" typeface="Myanmar Text"/>
+        <a:font script="Nkoo" typeface="Ebrima"/>
+        <a:font script="Olck" typeface="Nirmala UI"/>
+        <a:font script="Osma" typeface="Ebrima"/>
+        <a:font script="Phag" typeface="Phagspa"/>
+        <a:font script="Syrn" typeface="Estrangelo Edessa"/>
+        <a:font script="Syrj" typeface="Estrangelo Edessa"/>
+        <a:font script="Syre" typeface="Estrangelo Edessa"/>
+        <a:font script="Sora" typeface="Nirmala UI"/>
+        <a:font script="Tale" typeface="Microsoft Tai Le"/>
+        <a:font script="Talu" typeface="Microsoft New Tai Lue"/>
+        <a:font script="Tfng" typeface="Ebrima"/>
+      </a:majorFont>
+      <a:minorFont>
+        <a:latin typeface="Calibri" panose="020F0502020204030204"/>
+        <a:ea typeface=""/>
+        <a:cs typeface=""/>
+        <a:font script="Jpan" typeface="游ゴシック"/>
+        <a:font script="Hang" typeface="맑은 고딕"/>
+        <a:font script="Hans" typeface="等线"/>
+        <a:font script="Hant" typeface="新細明體"/>
+        <a:font script="Arab" typeface="Arial"/>
+        <a:font script="Hebr" typeface="Arial"/>
+        <a:font script="Thai" typeface="Cordia New"/>
+        <a:font script="Ethi" typeface="Nyala"/>
+        <a:font script="Beng" typeface="Vrinda"/>
+        <a:font script="Gujr" typeface="Shruti"/>
+        <a:font script="Khmr" typeface="DaunPenh"/>
+        <a:font script="Knda" typeface="Tunga"/>
+        <a:font script="Guru" typeface="Raavi"/>
+        <a:font script="Cans" typeface="Euphemia"/>
+        <a:font script="Cher" typeface="Plantagenet Cherokee"/>
+        <a:font script="Yiii" typeface="Microsoft Yi Baiti"/>
+        <a:font script="Tibt" typeface="Microsoft Himalaya"/>
+        <a:font script="Thaa" typeface="MV Boli"/>
+        <a:font script="Deva" typeface="Mangal"/>
+        <a:font script="Telu" typeface="Gautami"/>
+        <a:font script="Taml" typeface="Latha"/>
+        <a:font script="Syrc" typeface="Estrangelo Edessa"/>
+        <a:font script="Orya" typeface="Kalinga"/>
+        <a:font script="Mlym" typeface="Kartika"/>
+        <a:font script="Laoo" typeface="DokChampa"/>
+        <a:font script="Sinh" typeface="Iskoola Pota"/>
+        <a:font script="Mong" typeface="Mongolian Baiti"/>
+        <a:font script="Viet" typeface="Arial"/>
+        <a:font script="Uigh" typeface="Microsoft Uighur"/>
+        <a:font script="Geor" typeface="Sylfaen"/>
+        <a:font script="Armn" typeface="Arial"/>
+        <a:font script="Bugi" typeface="Leelawadee UI"/>
+        <a:font script="Bopo" typeface="Microsoft JhengHei"/>
+        <a:font script="Java" typeface="Javanese Text"/>
+        <a:font script="Lisu" typeface="Segoe UI"/>
+        <a:font script="Mymr" typeface="Myanmar Text"/>
+        <a:font script="Nkoo" typeface="Ebrima"/>
+        <a:font script="Olck" typeface="Nirmala UI"/>
+        <a:font script="Osma" typeface="Ebrima"/>
+        <a:font script="Phag" typeface="Phagspa"/>
+        <a:font script="Syrn" typeface="Estrangelo Edessa"/>
+        <a:font script="Syrj" typeface="Estrangelo Edessa"/>
+        <a:font script="Syre" typeface="Estrangelo Edessa"/>
+        <a:font script="Sora" typeface="Nirmala UI"/>
+        <a:font script="Tale" typeface="Microsoft Tai Le"/>
+        <a:font script="Talu" typeface="Microsoft New Tai Lue"/>
+        <a:font script="Tfng" typeface="Ebrima"/>
+      </a:minorFont>
+    </a:fontScheme>
+    <a:fmtScheme name="Office">
+      <a:fillStyleLst>
+        <a:solidFill>
+          <a:schemeClr val="phClr"/>
+        </a:solidFill>
+        <a:gradFill rotWithShape="1">
+          <a:gsLst>
+            <a:gs pos="0">
+              <a:schemeClr val="phClr">
+                <a:lumMod val="110000"/>
+                <a:satMod val="105000"/>
+                <a:tint val="67000"/>
+              </a:schemeClr>
+            </a:gs>
+            <a:gs pos="50000">
+              <a:schemeClr val="phClr">
+                <a:lumMod val="105000"/>
+                <a:satMod val="103000"/>
+                <a:tint val="73000"/>
+              </a:schemeClr>
+            </a:gs>
+            <a:gs pos="100000">
+              <a:schemeClr val="phClr">
+                <a:lumMod val="105000"/>
+                <a:satMod val="109000"/>
+                <a:tint val="81000"/>
+              </a:schemeClr>
+            </a:gs>
+          </a:gsLst>
+          <a:lin ang="5400000" scaled="0"/>
+        </a:gradFill>
+        <a:gradFill rotWithShape="1">
+          <a:gsLst>
+            <a:gs pos="0">
+              <a:schemeClr val="phClr">
+                <a:satMod val="103000"/>
+                <a:lumMod val="102000"/>
+                <a:tint val="94000"/>
+              </a:schemeClr>
+            </a:gs>
+            <a:gs pos="50000">
+              <a:schemeClr val="phClr">
+                <a:satMod val="110000"/>
+                <a:lumMod val="100000"/>
+                <a:shade val="100000"/>
+              </a:schemeClr>
+            </a:gs>
+            <a:gs pos="100000">
+              <a:schemeClr val="phClr">
+                <a:lumMod val="99000"/>
+                <a:satMod val="120000"/>
+                <a:shade val="78000"/>
+              </a:schemeClr>
+            </a:gs>
+          </a:gsLst>
+          <a:lin ang="5400000" scaled="0"/>
+        </a:gradFill>
+      </a:fillStyleLst>
+      <a:lnStyleLst>
+        <a:ln w="6350" cap="flat" cmpd="sng" algn="ctr">
+          <a:solidFill>
+            <a:schemeClr val="phClr"/>
+          </a:solidFill>
+          <a:prstDash val="solid"/>
+          <a:miter lim="800000"/>
+        </a:ln>
+        <a:ln w="12700" cap="flat" cmpd="sng" algn="ctr">
+          <a:solidFill>
+            <a:schemeClr val="phClr"/>
+          </a:solidFill>
+          <a:prstDash val="solid"/>
+          <a:miter lim="800000"/>
+        </a:ln>
+        <a:ln w="19050" cap="flat" cmpd="sng" algn="ctr">
+          <a:solidFill>
+            <a:schemeClr val="phClr"/>
+          </a:solidFill>
+          <a:prstDash val="solid"/>
+          <a:miter lim="800000"/>
+        </a:ln>
+      </a:lnStyleLst>
+      <a:effectStyleLst>
+        <a:effectStyle>
+          <a:effectLst/>
+        </a:effectStyle>
+        <a:effectStyle>
+          <a:effectLst/>
+        </a:effectStyle>
+        <a:effectStyle>
+          <a:effectLst>
+            <a:outerShdw blurRad="57150" dist="19050" dir="5400000" algn="ctr" rotWithShape="0">
+              <a:srgbClr val="000000">
+                <a:alpha val="63000"/>
+              </a:srgbClr>
+            </a:outerShdw>
+          </a:effectLst>
+        </a:effectStyle>
+      </a:effectStyleLst>
+      <a:bgFillStyleLst>
+        <a:solidFill>
+          <a:schemeClr val="phClr"/>
+        </a:solidFill>
+        <a:solidFill>
+          <a:schemeClr val="phClr">
+            <a:tint val="95000"/>
+            <a:satMod val="170000"/>
+          </a:schemeClr>
+        </a:solidFill>
+        <a:gradFill rotWithShape="1">
+          <a:gsLst>
+            <a:gs pos="0">
+              <a:schemeClr val="phClr">
+                <a:tint val="93000"/>
+                <a:satMod val="150000"/>
+                <a:shade val="98000"/>
+                <a:lumMod val="102000"/>
+              </a:schemeClr>
+            </a:gs>
+            <a:gs pos="50000">
+              <a:schemeClr val="phClr">
+                <a:tint val="98000"/>
+                <a:satMod val="130000"/>
+                <a:shade val="90000"/>
+                <a:lumMod val="103000"/>
+              </a:schemeClr>
+            </a:gs>
+            <a:gs pos="100000">
+              <a:schemeClr val="phClr">
+                <a:shade val="63000"/>
+                <a:satMod val="120000"/>
+              </a:schemeClr>
+            </a:gs>
+          </a:gsLst>
+          <a:lin ang="5400000" scaled="0"/>
+        </a:gradFill>
+      </a:bgFillStyleLst>
+    </a:fmtScheme>
+  </a:themeElements>
+  <a:objectDefaults/>
+  <a:extraClrSchemeLst/>
+  <a:extLst>
+    <a:ext uri="{05A4C25C-085E-4340-85A3-A5531E510DB2}">
+      <thm15:themeFamily xmlns:thm15="http://schemas.microsoft.com/office/thememl/2012/main" name="Office Theme" id="{62F939B6-93AF-4DB8-9C6B-D6C7DFDC589F}" vid="{4A3C46E8-61CC-4603-A589-7422A47A8E4A}"/>
+    </a:ext>
+  </a:extLst>
+</a:theme>
 </file>
</xml_diff>